<commit_message>
Remove unused import from test-xlsx-upload.js and delete a temporary PowerPoint file from docs
</commit_message>
<xml_diff>
--- a/docs/Autonóm_Üzleti_Elemző_MI_Architektúrális_Terve_3.1.pptx
+++ b/docs/Autonóm_Üzleti_Elemző_MI_Architektúrális_Terve_3.1.pptx
@@ -2917,8 +2917,8 @@
         </p:nvSpPr>
         <p:spPr>
           <a:xfrm>
-            <a:off x="1932859" y="1477696"/>
-            <a:ext cx="5278282" cy="544711"/>
+            <a:off x="1908611" y="1507678"/>
+            <a:ext cx="5326779" cy="484748"/>
           </a:xfrm>
           <a:prstGeom prst="rect">
             <a:avLst/>
@@ -2944,7 +2944,29 @@
                 <a:ea typeface="Noto Sans" pitchFamily="34" charset="-122"/>
                 <a:cs typeface="Noto Sans" pitchFamily="34" charset="-120"/>
               </a:rPr>
-              <a:t>Autonóm Üzleti Elemző MI</a:t>
+              <a:t>Autonóm Üzleti </a:t>
+            </a:r>
+            <a:r>
+              <a:rPr lang="en-US" sz="3150" b="1" dirty="0" err="1">
+                <a:solidFill>
+                  <a:srgbClr val="FFFFFF"/>
+                </a:solidFill>
+                <a:latin typeface="Noto Sans" pitchFamily="34" charset="0"/>
+                <a:ea typeface="Noto Sans" pitchFamily="34" charset="-122"/>
+                <a:cs typeface="Noto Sans" pitchFamily="34" charset="-120"/>
+              </a:rPr>
+              <a:t>Elemző</a:t>
+            </a:r>
+            <a:r>
+              <a:rPr lang="en-US" sz="3150" b="1" dirty="0">
+                <a:solidFill>
+                  <a:srgbClr val="FFFFFF"/>
+                </a:solidFill>
+                <a:latin typeface="Noto Sans" pitchFamily="34" charset="0"/>
+                <a:ea typeface="Noto Sans" pitchFamily="34" charset="-122"/>
+                <a:cs typeface="Noto Sans" pitchFamily="34" charset="-120"/>
+              </a:rPr>
+              <a:t> MI</a:t>
             </a:r>
             <a:endParaRPr lang="en-US" sz="3150" dirty="0"/>
           </a:p>
@@ -2958,8 +2980,8 @@
         </p:nvSpPr>
         <p:spPr>
           <a:xfrm>
-            <a:off x="2480723" y="1957750"/>
-            <a:ext cx="4182526" cy="544711"/>
+            <a:off x="3595863" y="2142718"/>
+            <a:ext cx="1971695" cy="369332"/>
           </a:xfrm>
           <a:prstGeom prst="rect">
             <a:avLst/>
@@ -2977,7 +2999,7 @@
               <a:buNone/>
             </a:pPr>
             <a:r>
-              <a:rPr lang="en-US" sz="3150" b="1" dirty="0">
+              <a:rPr lang="en-US" sz="2400" b="1" dirty="0" err="1">
                 <a:solidFill>
                   <a:srgbClr val="FFFFFF"/>
                 </a:solidFill>
@@ -2985,7 +3007,18 @@
                 <a:ea typeface="Noto Sans" pitchFamily="34" charset="-122"/>
                 <a:cs typeface="Noto Sans" pitchFamily="34" charset="-120"/>
               </a:rPr>
-              <a:t>Architektúrális Terve</a:t>
+              <a:t>Architektúr</a:t>
+            </a:r>
+            <a:r>
+              <a:rPr lang="hu-HU" sz="2400" b="1" dirty="0">
+                <a:solidFill>
+                  <a:srgbClr val="FFFFFF"/>
+                </a:solidFill>
+                <a:latin typeface="Noto Sans" pitchFamily="34" charset="0"/>
+                <a:ea typeface="Noto Sans" pitchFamily="34" charset="-122"/>
+                <a:cs typeface="Noto Sans" pitchFamily="34" charset="-120"/>
+              </a:rPr>
+              <a:t>a</a:t>
             </a:r>
             <a:endParaRPr lang="en-US" sz="3150" dirty="0"/>
           </a:p>
@@ -5296,7 +5329,7 @@
         </p:nvSpPr>
         <p:spPr>
           <a:xfrm>
-            <a:off x="750094" y="1869877"/>
+            <a:off x="750094" y="1967155"/>
             <a:ext cx="3463435" cy="317897"/>
           </a:xfrm>
           <a:prstGeom prst="rect">
@@ -5378,7 +5411,7 @@
         </p:nvSpPr>
         <p:spPr>
           <a:xfrm>
-            <a:off x="750094" y="2284214"/>
+            <a:off x="750094" y="2371766"/>
             <a:ext cx="3629946" cy="317897"/>
           </a:xfrm>
           <a:prstGeom prst="rect">
@@ -5460,7 +5493,7 @@
         </p:nvSpPr>
         <p:spPr>
           <a:xfrm>
-            <a:off x="750094" y="2698552"/>
+            <a:off x="750094" y="2786104"/>
             <a:ext cx="3291008" cy="317897"/>
           </a:xfrm>
           <a:prstGeom prst="rect">
@@ -5542,7 +5575,7 @@
         </p:nvSpPr>
         <p:spPr>
           <a:xfrm>
-            <a:off x="750094" y="3112889"/>
+            <a:off x="750094" y="3190713"/>
             <a:ext cx="3422275" cy="317897"/>
           </a:xfrm>
           <a:prstGeom prst="rect">
@@ -25180,7 +25213,7 @@
         </p:nvSpPr>
         <p:spPr>
           <a:xfrm>
-            <a:off x="885825" y="1584210"/>
+            <a:off x="885825" y="1681486"/>
             <a:ext cx="3346121" cy="305730"/>
           </a:xfrm>
           <a:prstGeom prst="rect">

</xml_diff>